<commit_message>
Added video support to presentations
Presentations can now have local videos as well. I'm not sure if
embedded videos from youtube and other online sites will work though.
That feature is missing from PowerPoint 2013 and I have no way to test
that.
</commit_message>
<xml_diff>
--- a/Parser/testsuite/test_files/slide2.pptx
+++ b/Parser/testsuite/test_files/slide2.pptx
@@ -311,7 +311,7 @@
           <a:p>
             <a:fld id="{EE980AB1-0036-47C0-813D-2A1653AC1BD2}" type="datetimeFigureOut">
               <a:rPr lang="en-US" smtClean="0"/>
-              <a:t>12/3/2013</a:t>
+              <a:t>12/10/2013</a:t>
             </a:fld>
             <a:endParaRPr lang="en-US"/>
           </a:p>
@@ -643,7 +643,7 @@
           <a:p>
             <a:fld id="{EE980AB1-0036-47C0-813D-2A1653AC1BD2}" type="datetimeFigureOut">
               <a:rPr lang="en-US" smtClean="0"/>
-              <a:t>12/3/2013</a:t>
+              <a:t>12/10/2013</a:t>
             </a:fld>
             <a:endParaRPr lang="en-US"/>
           </a:p>
@@ -1042,7 +1042,7 @@
           <a:p>
             <a:fld id="{EE980AB1-0036-47C0-813D-2A1653AC1BD2}" type="datetimeFigureOut">
               <a:rPr lang="en-US" smtClean="0"/>
-              <a:t>12/3/2013</a:t>
+              <a:t>12/10/2013</a:t>
             </a:fld>
             <a:endParaRPr lang="en-US"/>
           </a:p>
@@ -1376,7 +1376,7 @@
           <a:p>
             <a:fld id="{EE980AB1-0036-47C0-813D-2A1653AC1BD2}" type="datetimeFigureOut">
               <a:rPr lang="en-US" smtClean="0"/>
-              <a:t>12/3/2013</a:t>
+              <a:t>12/10/2013</a:t>
             </a:fld>
             <a:endParaRPr lang="en-US"/>
           </a:p>
@@ -1694,7 +1694,7 @@
           <a:p>
             <a:fld id="{EE980AB1-0036-47C0-813D-2A1653AC1BD2}" type="datetimeFigureOut">
               <a:rPr lang="en-US" smtClean="0"/>
-              <a:t>12/3/2013</a:t>
+              <a:t>12/10/2013</a:t>
             </a:fld>
             <a:endParaRPr lang="en-US"/>
           </a:p>
@@ -2088,7 +2088,7 @@
           <a:p>
             <a:fld id="{EE980AB1-0036-47C0-813D-2A1653AC1BD2}" type="datetimeFigureOut">
               <a:rPr lang="en-US" smtClean="0"/>
-              <a:t>12/3/2013</a:t>
+              <a:t>12/10/2013</a:t>
             </a:fld>
             <a:endParaRPr lang="en-US"/>
           </a:p>
@@ -2343,7 +2343,7 @@
           <a:p>
             <a:fld id="{EE980AB1-0036-47C0-813D-2A1653AC1BD2}" type="datetimeFigureOut">
               <a:rPr lang="en-US" smtClean="0"/>
-              <a:t>12/3/2013</a:t>
+              <a:t>12/10/2013</a:t>
             </a:fld>
             <a:endParaRPr lang="en-US"/>
           </a:p>
@@ -2603,7 +2603,7 @@
           <a:p>
             <a:fld id="{EE980AB1-0036-47C0-813D-2A1653AC1BD2}" type="datetimeFigureOut">
               <a:rPr lang="en-US" smtClean="0"/>
-              <a:t>12/3/2013</a:t>
+              <a:t>12/10/2013</a:t>
             </a:fld>
             <a:endParaRPr lang="en-US"/>
           </a:p>
@@ -2863,7 +2863,7 @@
           <a:p>
             <a:fld id="{EE980AB1-0036-47C0-813D-2A1653AC1BD2}" type="datetimeFigureOut">
               <a:rPr lang="en-US" smtClean="0"/>
-              <a:t>12/3/2013</a:t>
+              <a:t>12/10/2013</a:t>
             </a:fld>
             <a:endParaRPr lang="en-US"/>
           </a:p>
@@ -3190,7 +3190,7 @@
           <a:p>
             <a:fld id="{EE980AB1-0036-47C0-813D-2A1653AC1BD2}" type="datetimeFigureOut">
               <a:rPr lang="en-US" smtClean="0"/>
-              <a:t>12/3/2013</a:t>
+              <a:t>12/10/2013</a:t>
             </a:fld>
             <a:endParaRPr lang="en-US"/>
           </a:p>
@@ -3511,7 +3511,7 @@
           <a:p>
             <a:fld id="{EE980AB1-0036-47C0-813D-2A1653AC1BD2}" type="datetimeFigureOut">
               <a:rPr lang="en-US" smtClean="0"/>
-              <a:t>12/3/2013</a:t>
+              <a:t>12/10/2013</a:t>
             </a:fld>
             <a:endParaRPr lang="en-US"/>
           </a:p>
@@ -3966,7 +3966,7 @@
           <a:p>
             <a:fld id="{EE980AB1-0036-47C0-813D-2A1653AC1BD2}" type="datetimeFigureOut">
               <a:rPr lang="en-US" smtClean="0"/>
-              <a:t>12/3/2013</a:t>
+              <a:t>12/10/2013</a:t>
             </a:fld>
             <a:endParaRPr lang="en-US"/>
           </a:p>
@@ -4174,7 +4174,7 @@
           <a:p>
             <a:fld id="{EE980AB1-0036-47C0-813D-2A1653AC1BD2}" type="datetimeFigureOut">
               <a:rPr lang="en-US" smtClean="0"/>
-              <a:t>12/3/2013</a:t>
+              <a:t>12/10/2013</a:t>
             </a:fld>
             <a:endParaRPr lang="en-US"/>
           </a:p>
@@ -4349,7 +4349,7 @@
           <a:p>
             <a:fld id="{EE980AB1-0036-47C0-813D-2A1653AC1BD2}" type="datetimeFigureOut">
               <a:rPr lang="en-US" smtClean="0"/>
-              <a:t>12/3/2013</a:t>
+              <a:t>12/10/2013</a:t>
             </a:fld>
             <a:endParaRPr lang="en-US"/>
           </a:p>
@@ -4680,7 +4680,7 @@
           <a:p>
             <a:fld id="{EE980AB1-0036-47C0-813D-2A1653AC1BD2}" type="datetimeFigureOut">
               <a:rPr lang="en-US" smtClean="0"/>
-              <a:t>12/3/2013</a:t>
+              <a:t>12/10/2013</a:t>
             </a:fld>
             <a:endParaRPr lang="en-US"/>
           </a:p>
@@ -5023,7 +5023,7 @@
           <a:p>
             <a:fld id="{EE980AB1-0036-47C0-813D-2A1653AC1BD2}" type="datetimeFigureOut">
               <a:rPr lang="en-US" smtClean="0"/>
-              <a:t>12/3/2013</a:t>
+              <a:t>12/10/2013</a:t>
             </a:fld>
             <a:endParaRPr lang="en-US"/>
           </a:p>
@@ -7143,7 +7143,7 @@
           <a:p>
             <a:fld id="{EE980AB1-0036-47C0-813D-2A1653AC1BD2}" type="datetimeFigureOut">
               <a:rPr lang="en-US" smtClean="0"/>
-              <a:t>12/3/2013</a:t>
+              <a:t>12/10/2013</a:t>
             </a:fld>
             <a:endParaRPr lang="en-US"/>
           </a:p>
@@ -7724,7 +7724,7 @@
           <p:nvPr/>
         </p:nvPicPr>
         <p:blipFill>
-          <a:blip r:embed="rId2">
+          <a:blip r:embed="rId4">
             <a:extLst>
               <a:ext uri="{28A0092B-C50C-407E-A947-70E740481C1C}">
                 <a14:useLocalDpi xmlns:a14="http://schemas.microsoft.com/office/drawing/2010/main" val="0"/>
@@ -7737,8 +7737,41 @@
         </p:blipFill>
         <p:spPr>
           <a:xfrm>
-            <a:off x="3733800" y="3505200"/>
+            <a:off x="1752600" y="2743200"/>
             <a:ext cx="1676400" cy="1676400"/>
+          </a:xfrm>
+          <a:prstGeom prst="rect">
+            <a:avLst/>
+          </a:prstGeom>
+        </p:spPr>
+      </p:pic>
+      <p:pic>
+        <p:nvPicPr>
+          <p:cNvPr id="5" name="samplevideo">
+            <a:hlinkClick r:id="" action="ppaction://media"/>
+          </p:cNvPr>
+          <p:cNvPicPr>
+            <a:picLocks noChangeAspect="1"/>
+          </p:cNvPicPr>
+          <p:nvPr>
+            <a:videoFile r:link="rId2"/>
+            <p:extLst>
+              <p:ext uri="{DAA4B4D4-6D71-4841-9C94-3DE7FCFB9230}">
+                <p14:media xmlns:p14="http://schemas.microsoft.com/office/powerpoint/2010/main" r:embed="rId1"/>
+              </p:ext>
+            </p:extLst>
+          </p:nvPr>
+        </p:nvPicPr>
+        <p:blipFill>
+          <a:blip r:embed="rId5"/>
+          <a:stretch>
+            <a:fillRect/>
+          </a:stretch>
+        </p:blipFill>
+        <p:spPr>
+          <a:xfrm>
+            <a:off x="4191000" y="2743200"/>
+            <a:ext cx="4001185" cy="3000889"/>
           </a:xfrm>
           <a:prstGeom prst="rect">
             <a:avLst/>
@@ -7758,7 +7791,80 @@
   <p:timing>
     <p:tnLst>
       <p:par>
-        <p:cTn id="1" dur="indefinite" restart="never" nodeType="tmRoot"/>
+        <p:cTn id="1" dur="indefinite" restart="never" nodeType="tmRoot">
+          <p:childTnLst>
+            <p:seq concurrent="1" nextAc="seek">
+              <p:cTn id="2" restart="whenNotActive" fill="hold" evtFilter="cancelBubble" nodeType="interactiveSeq">
+                <p:stCondLst>
+                  <p:cond evt="onClick" delay="0">
+                    <p:tgtEl>
+                      <p:spTgt spid="5"/>
+                    </p:tgtEl>
+                  </p:cond>
+                </p:stCondLst>
+                <p:endSync evt="end" delay="0">
+                  <p:rtn val="all"/>
+                </p:endSync>
+                <p:childTnLst>
+                  <p:par>
+                    <p:cTn id="3" fill="hold">
+                      <p:stCondLst>
+                        <p:cond delay="0"/>
+                      </p:stCondLst>
+                      <p:childTnLst>
+                        <p:par>
+                          <p:cTn id="4" fill="hold">
+                            <p:stCondLst>
+                              <p:cond delay="0"/>
+                            </p:stCondLst>
+                            <p:childTnLst>
+                              <p:par>
+                                <p:cTn id="5" presetID="2" presetClass="mediacall" presetSubtype="0" fill="hold" nodeType="clickEffect">
+                                  <p:stCondLst>
+                                    <p:cond delay="0"/>
+                                  </p:stCondLst>
+                                  <p:childTnLst>
+                                    <p:cmd type="call" cmd="togglePause">
+                                      <p:cBhvr>
+                                        <p:cTn id="6" dur="1" fill="hold"/>
+                                        <p:tgtEl>
+                                          <p:spTgt spid="5"/>
+                                        </p:tgtEl>
+                                      </p:cBhvr>
+                                    </p:cmd>
+                                  </p:childTnLst>
+                                </p:cTn>
+                              </p:par>
+                            </p:childTnLst>
+                          </p:cTn>
+                        </p:par>
+                      </p:childTnLst>
+                    </p:cTn>
+                  </p:par>
+                </p:childTnLst>
+              </p:cTn>
+              <p:nextCondLst>
+                <p:cond evt="onClick" delay="0">
+                  <p:tgtEl>
+                    <p:spTgt spid="5"/>
+                  </p:tgtEl>
+                </p:cond>
+              </p:nextCondLst>
+            </p:seq>
+            <p:video>
+              <p:cMediaNode vol="80000">
+                <p:cTn id="7" fill="hold" display="0">
+                  <p:stCondLst>
+                    <p:cond delay="indefinite"/>
+                  </p:stCondLst>
+                </p:cTn>
+                <p:tgtEl>
+                  <p:spTgt spid="5"/>
+                </p:tgtEl>
+              </p:cMediaNode>
+            </p:video>
+          </p:childTnLst>
+        </p:cTn>
       </p:par>
     </p:tnLst>
   </p:timing>

</xml_diff>